<commit_message>
update work breakdown document
</commit_message>
<xml_diff>
--- a/Presentations/OpenPlaza - Phase 3.pptx
+++ b/Presentations/OpenPlaza - Phase 3.pptx
@@ -153,6 +153,27 @@
 </p188:authorLst>
 </file>
 
+<file path=ppt/changesInfos/changesInfo1.xml><?xml version="1.0" encoding="utf-8"?>
+<pc:chgInfo xmlns:a="http://schemas.openxmlformats.org/drawingml/2006/main" xmlns:r="http://schemas.openxmlformats.org/officeDocument/2006/relationships" xmlns:ac="http://schemas.microsoft.com/office/drawing/2013/main/command" xmlns:pc="http://schemas.microsoft.com/office/powerpoint/2013/main/command">
+  <pc:docChgLst>
+    <pc:chgData name="Anna Milligan" userId="71d62bc11ec1a38e" providerId="LiveId" clId="{A8EAF8E2-A6CA-4F85-8781-EDB88F09F9E5}"/>
+    <pc:docChg chg="modSld">
+      <pc:chgData name="Anna Milligan" userId="71d62bc11ec1a38e" providerId="LiveId" clId="{A8EAF8E2-A6CA-4F85-8781-EDB88F09F9E5}" dt="2025-04-22T21:01:14.875" v="1" actId="729"/>
+      <pc:docMkLst>
+        <pc:docMk/>
+      </pc:docMkLst>
+      <pc:sldChg chg="mod modShow">
+        <pc:chgData name="Anna Milligan" userId="71d62bc11ec1a38e" providerId="LiveId" clId="{A8EAF8E2-A6CA-4F85-8781-EDB88F09F9E5}" dt="2025-04-22T21:01:14.875" v="1" actId="729"/>
+        <pc:sldMkLst>
+          <pc:docMk/>
+          <pc:sldMk cId="487191499" sldId="336"/>
+        </pc:sldMkLst>
+      </pc:sldChg>
+    </pc:docChg>
+  </pc:docChgLst>
+</pc:chgInfo>
+</file>
+
 <file path=ppt/handoutMasters/handoutMaster1.xml><?xml version="1.0" encoding="utf-8"?>
 <p:handoutMaster xmlns:a="http://schemas.openxmlformats.org/drawingml/2006/main" xmlns:r="http://schemas.openxmlformats.org/officeDocument/2006/relationships" xmlns:p="http://schemas.openxmlformats.org/presentationml/2006/main">
   <p:cSld>
@@ -247,7 +268,7 @@
           <a:p>
             <a:fld id="{B149A72A-4651-45C7-9E42-35BFFD46D92F}" type="datetimeFigureOut">
               <a:rPr lang="en-US" smtClean="0"/>
-              <a:t>4/21/2025</a:t>
+              <a:t>4/22/2025</a:t>
             </a:fld>
             <a:endParaRPr lang="en-US" dirty="0"/>
           </a:p>
@@ -424,7 +445,7 @@
           <a:p>
             <a:fld id="{9D849352-39CB-486C-AEA5-5D17795DD0C7}" type="datetimeFigureOut">
               <a:rPr lang="en-US" smtClean="0"/>
-              <a:t>4/21/2025</a:t>
+              <a:t>4/22/2025</a:t>
             </a:fld>
             <a:endParaRPr lang="en-US" dirty="0"/>
           </a:p>
@@ -11511,6 +11532,15 @@
 </file>
 
 <file path=customXml/item1.xml><?xml version="1.0" encoding="utf-8"?>
+<?mso-contentType ?>
+<FormTemplates xmlns="http://schemas.microsoft.com/sharepoint/v3/contenttype/forms">
+  <Display>DocumentLibraryForm</Display>
+  <Edit>DocumentLibraryForm</Edit>
+  <New>DocumentLibraryForm</New>
+</FormTemplates>
+</file>
+
+<file path=customXml/item2.xml><?xml version="1.0" encoding="utf-8"?>
 <ct:contentTypeSchema xmlns:ct="http://schemas.microsoft.com/office/2006/metadata/contentType" xmlns:ma="http://schemas.microsoft.com/office/2006/metadata/properties/metaAttributes" ct:_="" ma:_="" ma:contentTypeName="Document" ma:contentTypeID="0x01010079F111ED35F8CC479449609E8A0923A6" ma:contentTypeVersion="28" ma:contentTypeDescription="Create a new document." ma:contentTypeScope="" ma:versionID="60f5a4f2d2b0abadcf532d48ebf9cb71">
   <xsd:schema xmlns:xsd="http://www.w3.org/2001/XMLSchema" xmlns:xs="http://www.w3.org/2001/XMLSchema" xmlns:p="http://schemas.microsoft.com/office/2006/metadata/properties" xmlns:ns1="http://schemas.microsoft.com/sharepoint/v3" xmlns:ns2="71af3243-3dd4-4a8d-8c0d-dd76da1f02a5" xmlns:ns3="16c05727-aa75-4e4a-9b5f-8a80a1165891" xmlns:ns4="230e9df3-be65-4c73-a93b-d1236ebd677e" targetNamespace="http://schemas.microsoft.com/office/2006/metadata/properties" ma:root="true" ma:fieldsID="7dd78129e6a1811f84807ad11c651531" ns1:_="" ns2:_="" ns3:_="" ns4:_="">
     <xsd:import namespace="http://schemas.microsoft.com/sharepoint/v3"/>
@@ -11822,15 +11852,6 @@
 </ct:contentTypeSchema>
 </file>
 
-<file path=customXml/item2.xml><?xml version="1.0" encoding="utf-8"?>
-<?mso-contentType ?>
-<FormTemplates xmlns="http://schemas.microsoft.com/sharepoint/v3/contenttype/forms">
-  <Display>DocumentLibraryForm</Display>
-  <Edit>DocumentLibraryForm</Edit>
-  <New>DocumentLibraryForm</New>
-</FormTemplates>
-</file>
-
 <file path=customXml/item3.xml><?xml version="1.0" encoding="utf-8"?>
 <p:properties xmlns:p="http://schemas.microsoft.com/office/2006/metadata/properties" xmlns:xsi="http://www.w3.org/2001/XMLSchema-instance" xmlns:pc="http://schemas.microsoft.com/office/infopath/2007/PartnerControls">
   <documentManagement>
@@ -11852,6 +11873,14 @@
 </file>
 
 <file path=customXml/itemProps1.xml><?xml version="1.0" encoding="utf-8"?>
+<ds:datastoreItem xmlns:ds="http://schemas.openxmlformats.org/officeDocument/2006/customXml" ds:itemID="{8CF92924-243E-4C73-8BD6-689D14A495F2}">
+  <ds:schemaRefs>
+    <ds:schemaRef ds:uri="http://schemas.microsoft.com/sharepoint/v3/contenttype/forms"/>
+  </ds:schemaRefs>
+</ds:datastoreItem>
+</file>
+
+<file path=customXml/itemProps2.xml><?xml version="1.0" encoding="utf-8"?>
 <ds:datastoreItem xmlns:ds="http://schemas.openxmlformats.org/officeDocument/2006/customXml" ds:itemID="{0D54F37A-6805-42D4-9FB4-3CFF01A7B973}">
   <ds:schemaRefs>
     <ds:schemaRef ds:uri="http://schemas.microsoft.com/office/2006/metadata/contentType"/>
@@ -11872,14 +11901,6 @@
 </ds:datastoreItem>
 </file>
 
-<file path=customXml/itemProps2.xml><?xml version="1.0" encoding="utf-8"?>
-<ds:datastoreItem xmlns:ds="http://schemas.openxmlformats.org/officeDocument/2006/customXml" ds:itemID="{8CF92924-243E-4C73-8BD6-689D14A495F2}">
-  <ds:schemaRefs>
-    <ds:schemaRef ds:uri="http://schemas.microsoft.com/sharepoint/v3/contenttype/forms"/>
-  </ds:schemaRefs>
-</ds:datastoreItem>
-</file>
-
 <file path=customXml/itemProps3.xml><?xml version="1.0" encoding="utf-8"?>
 <ds:datastoreItem xmlns:ds="http://schemas.openxmlformats.org/officeDocument/2006/customXml" ds:itemID="{51D389B5-45E8-4EA7-B5A7-604FF249CF70}">
   <ds:schemaRefs>

</xml_diff>